<commit_message>
updated SWE forecasting script, added stan scripts
</commit_message>
<xml_diff>
--- a/Project/FinalPresentation.pptx
+++ b/Project/FinalPresentation.pptx
@@ -113,6 +113,11 @@
       </a:defRPr>
     </a:lvl9pPr>
   </p:defaultTextStyle>
+  <p:extLst>
+    <p:ext uri="{EFAFB233-063F-42B5-8137-9DF3F51BA10A}">
+      <p15:sldGuideLst xmlns:p15="http://schemas.microsoft.com/office/powerpoint/2012/main"/>
+    </p:ext>
+  </p:extLst>
 </p:presentation>
 </file>
 
@@ -263,7 +268,7 @@
           <a:p>
             <a:fld id="{82EDB8D0-98ED-4B86-9D5F-E61ADC70144D}" type="datetimeFigureOut">
               <a:rPr lang="en-US" smtClean="0"/>
-              <a:t>5/6/24</a:t>
+              <a:t>5/10/24</a:t>
             </a:fld>
             <a:endParaRPr lang="en-US" dirty="0"/>
           </a:p>
@@ -678,7 +683,7 @@
           <a:p>
             <a:fld id="{82EDB8D0-98ED-4B86-9D5F-E61ADC70144D}" type="datetimeFigureOut">
               <a:rPr lang="en-US" smtClean="0"/>
-              <a:t>5/6/24</a:t>
+              <a:t>5/10/24</a:t>
             </a:fld>
             <a:endParaRPr lang="en-US"/>
           </a:p>
@@ -1170,7 +1175,7 @@
           <a:p>
             <a:fld id="{82EDB8D0-98ED-4B86-9D5F-E61ADC70144D}" type="datetimeFigureOut">
               <a:rPr lang="en-US" smtClean="0"/>
-              <a:t>5/6/24</a:t>
+              <a:t>5/10/24</a:t>
             </a:fld>
             <a:endParaRPr lang="en-US"/>
           </a:p>
@@ -1657,7 +1662,7 @@
           <a:p>
             <a:fld id="{82EDB8D0-98ED-4B86-9D5F-E61ADC70144D}" type="datetimeFigureOut">
               <a:rPr lang="en-US" smtClean="0"/>
-              <a:t>5/6/24</a:t>
+              <a:t>5/10/24</a:t>
             </a:fld>
             <a:endParaRPr lang="en-US" dirty="0"/>
           </a:p>
@@ -2426,7 +2431,7 @@
           <a:p>
             <a:fld id="{82EDB8D0-98ED-4B86-9D5F-E61ADC70144D}" type="datetimeFigureOut">
               <a:rPr lang="en-US" smtClean="0"/>
-              <a:t>5/6/24</a:t>
+              <a:t>5/10/24</a:t>
             </a:fld>
             <a:endParaRPr lang="en-US"/>
           </a:p>
@@ -2908,7 +2913,7 @@
           <a:p>
             <a:fld id="{82EDB8D0-98ED-4B86-9D5F-E61ADC70144D}" type="datetimeFigureOut">
               <a:rPr lang="en-US" smtClean="0"/>
-              <a:t>5/6/24</a:t>
+              <a:t>5/10/24</a:t>
             </a:fld>
             <a:endParaRPr lang="en-US"/>
           </a:p>
@@ -3604,7 +3609,7 @@
           <a:p>
             <a:fld id="{82EDB8D0-98ED-4B86-9D5F-E61ADC70144D}" type="datetimeFigureOut">
               <a:rPr lang="en-US" smtClean="0"/>
-              <a:t>5/6/24</a:t>
+              <a:t>5/10/24</a:t>
             </a:fld>
             <a:endParaRPr lang="en-US"/>
           </a:p>
@@ -4029,7 +4034,7 @@
           <a:p>
             <a:fld id="{82EDB8D0-98ED-4B86-9D5F-E61ADC70144D}" type="datetimeFigureOut">
               <a:rPr lang="en-US" smtClean="0"/>
-              <a:t>5/6/24</a:t>
+              <a:t>5/10/24</a:t>
             </a:fld>
             <a:endParaRPr lang="en-US"/>
           </a:p>
@@ -4426,7 +4431,7 @@
           <a:p>
             <a:fld id="{82EDB8D0-98ED-4B86-9D5F-E61ADC70144D}" type="datetimeFigureOut">
               <a:rPr lang="en-US" smtClean="0"/>
-              <a:t>5/6/24</a:t>
+              <a:t>5/10/24</a:t>
             </a:fld>
             <a:endParaRPr lang="en-US"/>
           </a:p>
@@ -5021,7 +5026,7 @@
           <a:p>
             <a:fld id="{82EDB8D0-98ED-4B86-9D5F-E61ADC70144D}" type="datetimeFigureOut">
               <a:rPr lang="en-US" smtClean="0"/>
-              <a:t>5/6/24</a:t>
+              <a:t>5/10/24</a:t>
             </a:fld>
             <a:endParaRPr lang="en-US"/>
           </a:p>
@@ -5596,7 +5601,7 @@
           <a:p>
             <a:fld id="{82EDB8D0-98ED-4B86-9D5F-E61ADC70144D}" type="datetimeFigureOut">
               <a:rPr lang="en-US" smtClean="0"/>
-              <a:t>5/6/24</a:t>
+              <a:t>5/10/24</a:t>
             </a:fld>
             <a:endParaRPr lang="en-US"/>
           </a:p>
@@ -6123,7 +6128,7 @@
             <a:fld id="{82EDB8D0-98ED-4B86-9D5F-E61ADC70144D}" type="datetimeFigureOut">
               <a:rPr lang="en-US" smtClean="0"/>
               <a:pPr/>
-              <a:t>5/6/24</a:t>
+              <a:t>5/10/24</a:t>
             </a:fld>
             <a:endParaRPr lang="en-US" dirty="0"/>
           </a:p>
@@ -6797,8 +6802,16 @@
           <a:lstStyle/>
           <a:p>
             <a:r>
+              <a:rPr lang="en-US" sz="4200" dirty="0"/>
+              <a:t>Forecasting Snow </a:t>
+            </a:r>
+            <a:r>
               <a:rPr lang="en-US" sz="4200"/>
-              <a:t>Forecasting Snow Water Equivalent Using 3 Sites in Alaska as a Case Study</a:t>
+              <a:t>Water Equivalent (SWE) </a:t>
+            </a:r>
+            <a:r>
+              <a:rPr lang="en-US" sz="4200" dirty="0"/>
+              <a:t>Using 3 Sites in Alaska as a Case Study</a:t>
             </a:r>
           </a:p>
         </p:txBody>

</xml_diff>